<commit_message>
feat: add voice materials
</commit_message>
<xml_diff>
--- a/GENAI_W4.pptx
+++ b/GENAI_W4.pptx
@@ -5,7 +5,7 @@
     <p:sldMasterId id="2147483648" r:id="rId1"/>
   </p:sldMasterIdLst>
   <p:notesMasterIdLst>
-    <p:notesMasterId r:id="rId14"/>
+    <p:notesMasterId r:id="rId20"/>
   </p:notesMasterIdLst>
   <p:sldIdLst>
     <p:sldId id="256" r:id="rId2"/>
@@ -20,6 +20,12 @@
     <p:sldId id="418" r:id="rId11"/>
     <p:sldId id="419" r:id="rId12"/>
     <p:sldId id="420" r:id="rId13"/>
+    <p:sldId id="421" r:id="rId14"/>
+    <p:sldId id="422" r:id="rId15"/>
+    <p:sldId id="423" r:id="rId16"/>
+    <p:sldId id="424" r:id="rId17"/>
+    <p:sldId id="425" r:id="rId18"/>
+    <p:sldId id="426" r:id="rId19"/>
   </p:sldIdLst>
   <p:sldSz cx="12192000" cy="6858000"/>
   <p:notesSz cx="6858000" cy="9144000"/>
@@ -231,7 +237,7 @@
           <a:p>
             <a:fld id="{442AD13C-532C-48A9-AF48-A57AEED0EC6D}" type="datetimeFigureOut">
               <a:rPr lang="en-GB" smtClean="0"/>
-              <a:t>11/04/2025</a:t>
+              <a:t>16/01/2026</a:t>
             </a:fld>
             <a:endParaRPr lang="en-GB"/>
           </a:p>
@@ -1543,7 +1549,7 @@
           <a:p>
             <a:fld id="{32F2E453-D685-4586-AF87-0ABDA9DFFD66}" type="datetimeFigureOut">
               <a:rPr lang="en-GB" smtClean="0"/>
-              <a:t>11/04/2025</a:t>
+              <a:t>16/01/2026</a:t>
             </a:fld>
             <a:endParaRPr lang="en-GB"/>
           </a:p>
@@ -1743,7 +1749,7 @@
           <a:p>
             <a:fld id="{32F2E453-D685-4586-AF87-0ABDA9DFFD66}" type="datetimeFigureOut">
               <a:rPr lang="en-GB" smtClean="0"/>
-              <a:t>11/04/2025</a:t>
+              <a:t>16/01/2026</a:t>
             </a:fld>
             <a:endParaRPr lang="en-GB"/>
           </a:p>
@@ -1953,7 +1959,7 @@
           <a:p>
             <a:fld id="{32F2E453-D685-4586-AF87-0ABDA9DFFD66}" type="datetimeFigureOut">
               <a:rPr lang="en-GB" smtClean="0"/>
-              <a:t>11/04/2025</a:t>
+              <a:t>16/01/2026</a:t>
             </a:fld>
             <a:endParaRPr lang="en-GB"/>
           </a:p>
@@ -2153,7 +2159,7 @@
           <a:p>
             <a:fld id="{32F2E453-D685-4586-AF87-0ABDA9DFFD66}" type="datetimeFigureOut">
               <a:rPr lang="en-GB" smtClean="0"/>
-              <a:t>11/04/2025</a:t>
+              <a:t>16/01/2026</a:t>
             </a:fld>
             <a:endParaRPr lang="en-GB"/>
           </a:p>
@@ -2429,7 +2435,7 @@
           <a:p>
             <a:fld id="{32F2E453-D685-4586-AF87-0ABDA9DFFD66}" type="datetimeFigureOut">
               <a:rPr lang="en-GB" smtClean="0"/>
-              <a:t>11/04/2025</a:t>
+              <a:t>16/01/2026</a:t>
             </a:fld>
             <a:endParaRPr lang="en-GB"/>
           </a:p>
@@ -2697,7 +2703,7 @@
           <a:p>
             <a:fld id="{32F2E453-D685-4586-AF87-0ABDA9DFFD66}" type="datetimeFigureOut">
               <a:rPr lang="en-GB" smtClean="0"/>
-              <a:t>11/04/2025</a:t>
+              <a:t>16/01/2026</a:t>
             </a:fld>
             <a:endParaRPr lang="en-GB"/>
           </a:p>
@@ -3112,7 +3118,7 @@
           <a:p>
             <a:fld id="{32F2E453-D685-4586-AF87-0ABDA9DFFD66}" type="datetimeFigureOut">
               <a:rPr lang="en-GB" smtClean="0"/>
-              <a:t>11/04/2025</a:t>
+              <a:t>16/01/2026</a:t>
             </a:fld>
             <a:endParaRPr lang="en-GB"/>
           </a:p>
@@ -3254,7 +3260,7 @@
           <a:p>
             <a:fld id="{32F2E453-D685-4586-AF87-0ABDA9DFFD66}" type="datetimeFigureOut">
               <a:rPr lang="en-GB" smtClean="0"/>
-              <a:t>11/04/2025</a:t>
+              <a:t>16/01/2026</a:t>
             </a:fld>
             <a:endParaRPr lang="en-GB"/>
           </a:p>
@@ -3367,7 +3373,7 @@
           <a:p>
             <a:fld id="{32F2E453-D685-4586-AF87-0ABDA9DFFD66}" type="datetimeFigureOut">
               <a:rPr lang="en-GB" smtClean="0"/>
-              <a:t>11/04/2025</a:t>
+              <a:t>16/01/2026</a:t>
             </a:fld>
             <a:endParaRPr lang="en-GB"/>
           </a:p>
@@ -3680,7 +3686,7 @@
           <a:p>
             <a:fld id="{32F2E453-D685-4586-AF87-0ABDA9DFFD66}" type="datetimeFigureOut">
               <a:rPr lang="en-GB" smtClean="0"/>
-              <a:t>11/04/2025</a:t>
+              <a:t>16/01/2026</a:t>
             </a:fld>
             <a:endParaRPr lang="en-GB"/>
           </a:p>
@@ -3969,7 +3975,7 @@
           <a:p>
             <a:fld id="{32F2E453-D685-4586-AF87-0ABDA9DFFD66}" type="datetimeFigureOut">
               <a:rPr lang="en-GB" smtClean="0"/>
-              <a:t>11/04/2025</a:t>
+              <a:t>16/01/2026</a:t>
             </a:fld>
             <a:endParaRPr lang="en-GB"/>
           </a:p>
@@ -4212,7 +4218,7 @@
           <a:p>
             <a:fld id="{32F2E453-D685-4586-AF87-0ABDA9DFFD66}" type="datetimeFigureOut">
               <a:rPr lang="en-GB" smtClean="0"/>
-              <a:t>11/04/2025</a:t>
+              <a:t>16/01/2026</a:t>
             </a:fld>
             <a:endParaRPr lang="en-GB"/>
           </a:p>
@@ -5479,6 +5485,1733 @@
     <p:extLst>
       <p:ext uri="{BB962C8B-B14F-4D97-AF65-F5344CB8AC3E}">
         <p14:creationId xmlns:p14="http://schemas.microsoft.com/office/powerpoint/2010/main" val="141713482"/>
+      </p:ext>
+    </p:extLst>
+  </p:cSld>
+  <p:clrMapOvr>
+    <a:masterClrMapping/>
+  </p:clrMapOvr>
+</p:sld>
+</file>
+
+<file path=ppt/slides/slide13.xml><?xml version="1.0" encoding="utf-8"?>
+<p:sld xmlns:a="http://schemas.openxmlformats.org/drawingml/2006/main" xmlns:r="http://schemas.openxmlformats.org/officeDocument/2006/relationships" xmlns:p="http://schemas.openxmlformats.org/presentationml/2006/main">
+  <p:cSld>
+    <p:spTree>
+      <p:nvGrpSpPr>
+        <p:cNvPr id="1" name="">
+          <a:extLst>
+            <a:ext uri="{FF2B5EF4-FFF2-40B4-BE49-F238E27FC236}">
+              <a16:creationId xmlns:a16="http://schemas.microsoft.com/office/drawing/2014/main" id="{8CEEC55B-C261-4411-9BC5-46C0E87B40D1}"/>
+            </a:ext>
+          </a:extLst>
+        </p:cNvPr>
+        <p:cNvGrpSpPr/>
+        <p:nvPr/>
+      </p:nvGrpSpPr>
+      <p:grpSpPr>
+        <a:xfrm>
+          <a:off x="0" y="0"/>
+          <a:ext cx="0" cy="0"/>
+          <a:chOff x="0" y="0"/>
+          <a:chExt cx="0" cy="0"/>
+        </a:xfrm>
+      </p:grpSpPr>
+      <p:sp>
+        <p:nvSpPr>
+          <p:cNvPr id="3" name="Rectangle">
+            <a:extLst>
+              <a:ext uri="{FF2B5EF4-FFF2-40B4-BE49-F238E27FC236}">
+                <a16:creationId xmlns:a16="http://schemas.microsoft.com/office/drawing/2014/main" id="{31B700CE-EF26-4E53-925C-A27206A77649}"/>
+              </a:ext>
+            </a:extLst>
+          </p:cNvPr>
+          <p:cNvSpPr/>
+          <p:nvPr/>
+        </p:nvSpPr>
+        <p:spPr>
+          <a:xfrm>
+            <a:off x="0" y="0"/>
+            <a:ext cx="12192000" cy="6858000"/>
+          </a:xfrm>
+          <a:prstGeom prst="rect">
+            <a:avLst/>
+          </a:prstGeom>
+          <a:solidFill>
+            <a:srgbClr val="002060"/>
+          </a:solidFill>
+        </p:spPr>
+        <p:txBody>
+          <a:bodyPr rtlCol="0" anchor="ctr"/>
+          <a:lstStyle/>
+          <a:p>
+            <a:pPr algn="ctr"/>
+            <a:endParaRPr lang="en-GB"/>
+          </a:p>
+        </p:txBody>
+      </p:sp>
+      <p:sp>
+        <p:nvSpPr>
+          <p:cNvPr id="2" name="Title">
+            <a:extLst>
+              <a:ext uri="{FF2B5EF4-FFF2-40B4-BE49-F238E27FC236}">
+                <a16:creationId xmlns:a16="http://schemas.microsoft.com/office/drawing/2014/main" id="{616A8D08-600B-4A03-ACDD-96E1621E95DD}"/>
+              </a:ext>
+            </a:extLst>
+          </p:cNvPr>
+          <p:cNvSpPr>
+            <a:spLocks noGrp="1"/>
+          </p:cNvSpPr>
+          <p:nvPr>
+            <p:ph type="ctrTitle"/>
+          </p:nvPr>
+        </p:nvSpPr>
+        <p:spPr/>
+        <p:txBody>
+          <a:bodyPr>
+            <a:normAutofit/>
+          </a:bodyPr>
+          <a:lstStyle/>
+          <a:p>
+            <a:pPr>
+              <a:lnSpc>
+                <a:spcPct val="150000"/>
+              </a:lnSpc>
+            </a:pPr>
+            <a:r>
+              <a:rPr lang="en-US" sz="6000" b="1" dirty="0">
+                <a:solidFill>
+                  <a:schemeClr val="bg1"/>
+                </a:solidFill>
+                <a:latin typeface="Poppins" panose="00000500000000000000" pitchFamily="2" charset="-18"/>
+                <a:cs typeface="Poppins" panose="00000500000000000000" pitchFamily="2" charset="-18"/>
+              </a:rPr>
+              <a:t>GenAI Voice Solutions</a:t>
+            </a:r>
+          </a:p>
+        </p:txBody>
+      </p:sp>
+    </p:spTree>
+    <p:extLst>
+      <p:ext uri="{BB962C8B-B14F-4D97-AF65-F5344CB8AC3E}">
+        <p14:creationId xmlns:p14="http://schemas.microsoft.com/office/powerpoint/2010/main" val="503038764"/>
+      </p:ext>
+    </p:extLst>
+  </p:cSld>
+  <p:clrMapOvr>
+    <a:masterClrMapping/>
+  </p:clrMapOvr>
+</p:sld>
+</file>
+
+<file path=ppt/slides/slide14.xml><?xml version="1.0" encoding="utf-8"?>
+<p:sld xmlns:a="http://schemas.openxmlformats.org/drawingml/2006/main" xmlns:r="http://schemas.openxmlformats.org/officeDocument/2006/relationships" xmlns:p="http://schemas.openxmlformats.org/presentationml/2006/main">
+  <p:cSld>
+    <p:spTree>
+      <p:nvGrpSpPr>
+        <p:cNvPr id="1" name="Shape">
+          <a:extLst>
+            <a:ext uri="{FF2B5EF4-FFF2-40B4-BE49-F238E27FC236}">
+              <a16:creationId xmlns:a16="http://schemas.microsoft.com/office/drawing/2014/main" id="{B6E8A251-565A-41C1-BFC1-B5E53D268DF6}"/>
+            </a:ext>
+          </a:extLst>
+        </p:cNvPr>
+        <p:cNvGrpSpPr/>
+        <p:nvPr/>
+      </p:nvGrpSpPr>
+      <p:grpSpPr>
+        <a:xfrm>
+          <a:off x="0" y="0"/>
+          <a:ext cx="0" cy="0"/>
+          <a:chOff x="0" y="0"/>
+          <a:chExt cx="0" cy="0"/>
+        </a:xfrm>
+      </p:grpSpPr>
+      <p:sp>
+        <p:nvSpPr>
+          <p:cNvPr id="2" name="Title">
+            <a:extLst>
+              <a:ext uri="{FF2B5EF4-FFF2-40B4-BE49-F238E27FC236}">
+                <a16:creationId xmlns:a16="http://schemas.microsoft.com/office/drawing/2014/main" id="{8FAAE4A3-D31A-4484-8F54-692E436D16B9}"/>
+              </a:ext>
+            </a:extLst>
+          </p:cNvPr>
+          <p:cNvSpPr txBox="1"/>
+          <p:nvPr/>
+        </p:nvSpPr>
+        <p:spPr>
+          <a:xfrm>
+            <a:off x="407988" y="450000"/>
+            <a:ext cx="11376000" cy="550000"/>
+          </a:xfrm>
+          <a:prstGeom prst="rect">
+            <a:avLst/>
+          </a:prstGeom>
+          <a:noFill/>
+          <a:ln>
+            <a:noFill/>
+          </a:ln>
+        </p:spPr>
+        <p:txBody>
+          <a:bodyPr spcFirstLastPara="1" wrap="square" lIns="91425" tIns="45700" rIns="91425" bIns="45700" anchor="t" anchorCtr="0">
+            <a:spAutoFit/>
+          </a:bodyPr>
+          <a:lstStyle/>
+          <a:p>
+            <a:pPr marL="0" marR="0" lvl="0" indent="0" algn="l" rtl="0">
+              <a:spcBef>
+                <a:spcPts val="0"/>
+              </a:spcBef>
+              <a:spcAft>
+                <a:spcPts val="0"/>
+              </a:spcAft>
+              <a:buNone/>
+            </a:pPr>
+            <a:r>
+              <a:rPr lang="en-US" sz="2800" b="1" dirty="0">
+                <a:solidFill>
+                  <a:schemeClr val="dk1"/>
+                </a:solidFill>
+                <a:latin typeface="Poppins"/>
+                <a:ea typeface="Poppins"/>
+                <a:cs typeface="Poppins"/>
+                <a:sym typeface="Poppins"/>
+              </a:rPr>
+              <a:t>What are Voice AI Solutions?</a:t>
+            </a:r>
+            <a:endParaRPr sz="2800" b="1" dirty="0">
+              <a:solidFill>
+                <a:schemeClr val="dk1"/>
+              </a:solidFill>
+              <a:latin typeface="Poppins"/>
+            </a:endParaRPr>
+          </a:p>
+        </p:txBody>
+      </p:sp>
+      <p:sp>
+        <p:nvSpPr>
+          <p:cNvPr id="3" name="Content">
+            <a:extLst>
+              <a:ext uri="{FF2B5EF4-FFF2-40B4-BE49-F238E27FC236}">
+                <a16:creationId xmlns:a16="http://schemas.microsoft.com/office/drawing/2014/main" id="{048DABD6-D5E5-4220-A078-31D3B1AC7867}"/>
+              </a:ext>
+            </a:extLst>
+          </p:cNvPr>
+          <p:cNvSpPr txBox="1"/>
+          <p:nvPr/>
+        </p:nvSpPr>
+        <p:spPr>
+          <a:xfrm>
+            <a:off x="407988" y="1200000"/>
+            <a:ext cx="11376000" cy="5000000"/>
+          </a:xfrm>
+          <a:prstGeom prst="rect">
+            <a:avLst/>
+          </a:prstGeom>
+          <a:noFill/>
+        </p:spPr>
+        <p:txBody>
+          <a:bodyPr wrap="square" lIns="91425" tIns="45700" rIns="91425" bIns="45700" anchor="t">
+            <a:spAutoFit/>
+          </a:bodyPr>
+          <a:lstStyle/>
+          <a:p>
+            <a:pPr marL="285750" indent="-285750">
+              <a:buFont typeface="Arial" panose="020B0604020202020204" pitchFamily="34" charset="0"/>
+              <a:buChar char="•"/>
+            </a:pPr>
+            <a:r>
+              <a:rPr lang="en-US" sz="1800" dirty="0">
+                <a:latin typeface="Poppins" panose="00000500000000000000" pitchFamily="2" charset="-18"/>
+                <a:cs typeface="Poppins" panose="00000500000000000000" pitchFamily="2" charset="-18"/>
+              </a:rPr>
+              <a:t>Voice AI enables natural spoken conversations between humans and AI systems</a:t>
+            </a:r>
+            <a:endParaRPr lang="en-US" sz="1800" dirty="0"/>
+          </a:p>
+          <a:p>
+            <a:pPr marL="285750" indent="-285750">
+              <a:buFont typeface="Arial" panose="020B0604020202020204" pitchFamily="34" charset="0"/>
+              <a:buChar char="•"/>
+            </a:pPr>
+            <a:r>
+              <a:rPr lang="en-US" sz="1800" dirty="0">
+                <a:latin typeface="Poppins" panose="00000500000000000000" pitchFamily="2" charset="-18"/>
+                <a:cs typeface="Poppins" panose="00000500000000000000" pitchFamily="2" charset="-18"/>
+              </a:rPr>
+              <a:t>Combines Speech Recognition (STT), Language Models (LLM), and Speech Synthesis (TTS)</a:t>
+            </a:r>
+            <a:endParaRPr lang="en-US" sz="1800" dirty="0"/>
+          </a:p>
+          <a:p>
+            <a:pPr marL="285750" indent="-285750">
+              <a:buFont typeface="Arial" panose="020B0604020202020204" pitchFamily="34" charset="0"/>
+              <a:buChar char="•"/>
+            </a:pPr>
+            <a:r>
+              <a:rPr lang="en-US" sz="1800" dirty="0">
+                <a:latin typeface="Poppins" panose="00000500000000000000" pitchFamily="2" charset="-18"/>
+                <a:cs typeface="Poppins" panose="00000500000000000000" pitchFamily="2" charset="-18"/>
+              </a:rPr>
+              <a:t>Goal: Create human-like conversational experiences without typing</a:t>
+            </a:r>
+            <a:endParaRPr lang="en-US" sz="1800" dirty="0"/>
+          </a:p>
+          <a:p>
+            <a:pPr marL="0" indent="0">
+              <a:buNone/>
+            </a:pPr>
+            <a:r>
+              <a:rPr lang="en-US" sz="2000" b="1" dirty="0">
+                <a:latin typeface="Poppins" panose="00000500000000000000" pitchFamily="2" charset="-18"/>
+                <a:cs typeface="Poppins" panose="00000500000000000000" pitchFamily="2" charset="-18"/>
+              </a:rPr>
+              <a:t>Key Components:</a:t>
+            </a:r>
+            <a:endParaRPr lang="en-US" sz="2000" b="1" dirty="0"/>
+          </a:p>
+          <a:p>
+            <a:pPr marL="285750" indent="-285750">
+              <a:buFont typeface="Arial" panose="020B0604020202020204" pitchFamily="34" charset="0"/>
+              <a:buChar char="•"/>
+            </a:pPr>
+            <a:r>
+              <a:rPr lang="en-US" sz="1800" dirty="0">
+                <a:latin typeface="Poppins" panose="00000500000000000000" pitchFamily="2" charset="-18"/>
+                <a:cs typeface="Poppins" panose="00000500000000000000" pitchFamily="2" charset="-18"/>
+              </a:rPr>
+              <a:t>Speech-to-Text (STT): Converts spoken audio into text (e.g., Whisper, Deepgram)</a:t>
+            </a:r>
+            <a:endParaRPr lang="en-US" sz="1800" dirty="0"/>
+          </a:p>
+          <a:p>
+            <a:pPr marL="285750" indent="-285750">
+              <a:buFont typeface="Arial" panose="020B0604020202020204" pitchFamily="34" charset="0"/>
+              <a:buChar char="•"/>
+            </a:pPr>
+            <a:r>
+              <a:rPr lang="en-US" sz="1800" dirty="0">
+                <a:latin typeface="Poppins" panose="00000500000000000000" pitchFamily="2" charset="-18"/>
+                <a:cs typeface="Poppins" panose="00000500000000000000" pitchFamily="2" charset="-18"/>
+              </a:rPr>
+              <a:t>Large Language Model (LLM): Processes text, generates intelligent responses</a:t>
+            </a:r>
+            <a:endParaRPr lang="en-US" sz="1800" dirty="0"/>
+          </a:p>
+          <a:p>
+            <a:pPr marL="285750" indent="-285750">
+              <a:buFont typeface="Arial" panose="020B0604020202020204" pitchFamily="34" charset="0"/>
+              <a:buChar char="•"/>
+            </a:pPr>
+            <a:r>
+              <a:rPr lang="en-US" sz="1800" dirty="0">
+                <a:latin typeface="Poppins" panose="00000500000000000000" pitchFamily="2" charset="-18"/>
+                <a:cs typeface="Poppins" panose="00000500000000000000" pitchFamily="2" charset="-18"/>
+              </a:rPr>
+              <a:t>Text-to-Speech (TTS): Converts text responses into natural-sounding audio</a:t>
+            </a:r>
+            <a:endParaRPr lang="en-US" sz="1800" dirty="0"/>
+          </a:p>
+        </p:txBody>
+      </p:sp>
+    </p:spTree>
+    <p:extLst>
+      <p:ext uri="{BB962C8B-B14F-4D97-AF65-F5344CB8AC3E}">
+        <p14:creationId xmlns:p14="http://schemas.microsoft.com/office/powerpoint/2010/main" val="2925016048"/>
+      </p:ext>
+    </p:extLst>
+  </p:cSld>
+  <p:clrMapOvr>
+    <a:masterClrMapping/>
+  </p:clrMapOvr>
+</p:sld>
+</file>
+
+<file path=ppt/slides/slide15.xml><?xml version="1.0" encoding="utf-8"?>
+<p:sld xmlns:a="http://schemas.openxmlformats.org/drawingml/2006/main" xmlns:r="http://schemas.openxmlformats.org/officeDocument/2006/relationships" xmlns:p="http://schemas.openxmlformats.org/presentationml/2006/main">
+  <p:cSld>
+    <p:spTree>
+      <p:nvGrpSpPr>
+        <p:cNvPr id="1" name="Shape">
+          <a:extLst>
+            <a:ext uri="{FF2B5EF4-FFF2-40B4-BE49-F238E27FC236}">
+              <a16:creationId xmlns:a16="http://schemas.microsoft.com/office/drawing/2014/main" id="{9888F00D-F51B-4D30-A53D-9EEC001B1845}"/>
+            </a:ext>
+          </a:extLst>
+        </p:cNvPr>
+        <p:cNvGrpSpPr/>
+        <p:nvPr/>
+      </p:nvGrpSpPr>
+      <p:grpSpPr>
+        <a:xfrm>
+          <a:off x="0" y="0"/>
+          <a:ext cx="0" cy="0"/>
+          <a:chOff x="0" y="0"/>
+          <a:chExt cx="0" cy="0"/>
+        </a:xfrm>
+      </p:grpSpPr>
+      <p:sp>
+        <p:nvSpPr>
+          <p:cNvPr id="2" name="Title">
+            <a:extLst>
+              <a:ext uri="{FF2B5EF4-FFF2-40B4-BE49-F238E27FC236}">
+                <a16:creationId xmlns:a16="http://schemas.microsoft.com/office/drawing/2014/main" id="{DD4F8B16-B03E-4984-8CDD-9DB86EA01813}"/>
+              </a:ext>
+            </a:extLst>
+          </p:cNvPr>
+          <p:cNvSpPr txBox="1"/>
+          <p:nvPr/>
+        </p:nvSpPr>
+        <p:spPr>
+          <a:xfrm>
+            <a:off x="407988" y="450000"/>
+            <a:ext cx="11376000" cy="550000"/>
+          </a:xfrm>
+          <a:prstGeom prst="rect">
+            <a:avLst/>
+          </a:prstGeom>
+          <a:noFill/>
+          <a:ln>
+            <a:noFill/>
+          </a:ln>
+        </p:spPr>
+        <p:txBody>
+          <a:bodyPr spcFirstLastPara="1" wrap="square" lIns="91425" tIns="45700" rIns="91425" bIns="45700" anchor="t" anchorCtr="0">
+            <a:spAutoFit/>
+          </a:bodyPr>
+          <a:lstStyle/>
+          <a:p>
+            <a:pPr marL="0" marR="0" lvl="0" indent="0" algn="l" rtl="0">
+              <a:spcBef>
+                <a:spcPts val="0"/>
+              </a:spcBef>
+              <a:spcAft>
+                <a:spcPts val="0"/>
+              </a:spcAft>
+              <a:buNone/>
+            </a:pPr>
+            <a:r>
+              <a:rPr lang="en-US" sz="2800" b="1" dirty="0">
+                <a:solidFill>
+                  <a:schemeClr val="dk1"/>
+                </a:solidFill>
+                <a:latin typeface="Poppins"/>
+                <a:ea typeface="Poppins"/>
+                <a:cs typeface="Poppins"/>
+                <a:sym typeface="Poppins"/>
+              </a:rPr>
+              <a:t>Voice AI Use Cases</a:t>
+            </a:r>
+            <a:endParaRPr sz="2800" b="1" dirty="0">
+              <a:solidFill>
+                <a:schemeClr val="dk1"/>
+              </a:solidFill>
+              <a:latin typeface="Poppins"/>
+            </a:endParaRPr>
+          </a:p>
+        </p:txBody>
+      </p:sp>
+      <p:sp>
+        <p:nvSpPr>
+          <p:cNvPr id="4" name="Subtitle">
+            <a:extLst>
+              <a:ext uri="{FF2B5EF4-FFF2-40B4-BE49-F238E27FC236}">
+                <a16:creationId xmlns:a16="http://schemas.microsoft.com/office/drawing/2014/main" id="{D0A8C44C-A8FD-4DFF-A6DD-8B70F2E735EC}"/>
+              </a:ext>
+            </a:extLst>
+          </p:cNvPr>
+          <p:cNvSpPr txBox="1"/>
+          <p:nvPr/>
+        </p:nvSpPr>
+        <p:spPr>
+          <a:xfrm>
+            <a:off x="407988" y="1050000"/>
+            <a:ext cx="11376000" cy="400000"/>
+          </a:xfrm>
+          <a:prstGeom prst="rect">
+            <a:avLst/>
+          </a:prstGeom>
+          <a:noFill/>
+        </p:spPr>
+        <p:txBody>
+          <a:bodyPr wrap="square" lIns="91425" tIns="45700" rIns="91425" bIns="45700" anchor="t"/>
+          <a:lstStyle/>
+          <a:p>
+            <a:r>
+              <a:rPr lang="en-US" sz="1600" i="1" dirty="0">
+                <a:solidFill>
+                  <a:srgbClr val="666666"/>
+                </a:solidFill>
+                <a:latin typeface="Poppins" panose="00000500000000000000" pitchFamily="2" charset="-18"/>
+              </a:rPr>
+              <a:t>Real-world applications of conversational voice AI</a:t>
+            </a:r>
+          </a:p>
+        </p:txBody>
+      </p:sp>
+      <p:sp>
+        <p:nvSpPr>
+          <p:cNvPr id="3" name="Content">
+            <a:extLst>
+              <a:ext uri="{FF2B5EF4-FFF2-40B4-BE49-F238E27FC236}">
+                <a16:creationId xmlns:a16="http://schemas.microsoft.com/office/drawing/2014/main" id="{E7F2CD4C-8E53-48B1-91F6-1EC288432DAF}"/>
+              </a:ext>
+            </a:extLst>
+          </p:cNvPr>
+          <p:cNvSpPr txBox="1"/>
+          <p:nvPr/>
+        </p:nvSpPr>
+        <p:spPr>
+          <a:xfrm>
+            <a:off x="407988" y="1500000"/>
+            <a:ext cx="11376000" cy="5000000"/>
+          </a:xfrm>
+          <a:prstGeom prst="rect">
+            <a:avLst/>
+          </a:prstGeom>
+          <a:noFill/>
+        </p:spPr>
+        <p:txBody>
+          <a:bodyPr wrap="square" lIns="91425" tIns="45700" rIns="91425" bIns="45700" anchor="t">
+            <a:spAutoFit/>
+          </a:bodyPr>
+          <a:lstStyle/>
+          <a:p>
+            <a:pPr marL="0" indent="0">
+              <a:buNone/>
+            </a:pPr>
+            <a:r>
+              <a:rPr lang="en-US" sz="2000" b="1" dirty="0">
+                <a:latin typeface="Poppins" panose="00000500000000000000" pitchFamily="2" charset="-18"/>
+                <a:cs typeface="Poppins" panose="00000500000000000000" pitchFamily="2" charset="-18"/>
+              </a:rPr>
+              <a:t>Customer Service &amp; Support</a:t>
+            </a:r>
+            <a:endParaRPr lang="en-US" sz="2000" b="1" dirty="0"/>
+          </a:p>
+          <a:p>
+            <a:pPr marL="285750" indent="-285750">
+              <a:buFont typeface="Arial" panose="020B0604020202020204" pitchFamily="34" charset="0"/>
+              <a:buChar char="•"/>
+            </a:pPr>
+            <a:r>
+              <a:rPr lang="en-US" sz="1800" dirty="0">
+                <a:latin typeface="Poppins" panose="00000500000000000000" pitchFamily="2" charset="-18"/>
+                <a:cs typeface="Poppins" panose="00000500000000000000" pitchFamily="2" charset="-18"/>
+              </a:rPr>
+              <a:t>AI phone agents for 24/7 customer support (e.g., banks, airlines, telecom)</a:t>
+            </a:r>
+            <a:endParaRPr lang="en-US" sz="1800" dirty="0"/>
+          </a:p>
+          <a:p>
+            <a:pPr marL="285750" indent="-285750">
+              <a:buFont typeface="Arial" panose="020B0604020202020204" pitchFamily="34" charset="0"/>
+              <a:buChar char="•"/>
+            </a:pPr>
+            <a:r>
+              <a:rPr lang="en-US" sz="1800" dirty="0">
+                <a:latin typeface="Poppins" panose="00000500000000000000" pitchFamily="2" charset="-18"/>
+                <a:cs typeface="Poppins" panose="00000500000000000000" pitchFamily="2" charset="-18"/>
+              </a:rPr>
+              <a:t>Appointment scheduling and reservation systems</a:t>
+            </a:r>
+            <a:endParaRPr lang="en-US" sz="1800" dirty="0"/>
+          </a:p>
+          <a:p>
+            <a:pPr marL="0" indent="0">
+              <a:buNone/>
+            </a:pPr>
+            <a:r>
+              <a:rPr lang="en-US" sz="2000" b="1" dirty="0">
+                <a:latin typeface="Poppins" panose="00000500000000000000" pitchFamily="2" charset="-18"/>
+                <a:cs typeface="Poppins" panose="00000500000000000000" pitchFamily="2" charset="-18"/>
+              </a:rPr>
+              <a:t>Healthcare</a:t>
+            </a:r>
+            <a:endParaRPr lang="en-US" sz="2000" b="1" dirty="0"/>
+          </a:p>
+          <a:p>
+            <a:pPr marL="285750" indent="-285750">
+              <a:buFont typeface="Arial" panose="020B0604020202020204" pitchFamily="34" charset="0"/>
+              <a:buChar char="•"/>
+            </a:pPr>
+            <a:r>
+              <a:rPr lang="en-US" sz="1800" dirty="0">
+                <a:latin typeface="Poppins" panose="00000500000000000000" pitchFamily="2" charset="-18"/>
+                <a:cs typeface="Poppins" panose="00000500000000000000" pitchFamily="2" charset="-18"/>
+              </a:rPr>
+              <a:t>Patient intake and symptom screening via voice</a:t>
+            </a:r>
+            <a:endParaRPr lang="en-US" sz="1800" dirty="0"/>
+          </a:p>
+          <a:p>
+            <a:pPr marL="285750" indent="-285750">
+              <a:buFont typeface="Arial" panose="020B0604020202020204" pitchFamily="34" charset="0"/>
+              <a:buChar char="•"/>
+            </a:pPr>
+            <a:r>
+              <a:rPr lang="en-US" sz="1800" dirty="0">
+                <a:latin typeface="Poppins" panose="00000500000000000000" pitchFamily="2" charset="-18"/>
+                <a:cs typeface="Poppins" panose="00000500000000000000" pitchFamily="2" charset="-18"/>
+              </a:rPr>
+              <a:t>Medication reminders and health monitoring assistants</a:t>
+            </a:r>
+            <a:endParaRPr lang="en-US" sz="1800" dirty="0"/>
+          </a:p>
+          <a:p>
+            <a:pPr marL="0" indent="0">
+              <a:buNone/>
+            </a:pPr>
+            <a:r>
+              <a:rPr lang="en-US" sz="2000" b="1" dirty="0">
+                <a:latin typeface="Poppins" panose="00000500000000000000" pitchFamily="2" charset="-18"/>
+                <a:cs typeface="Poppins" panose="00000500000000000000" pitchFamily="2" charset="-18"/>
+              </a:rPr>
+              <a:t>Smart Assistants &amp; IoT</a:t>
+            </a:r>
+            <a:endParaRPr lang="en-US" sz="2000" b="1" dirty="0"/>
+          </a:p>
+          <a:p>
+            <a:pPr marL="285750" indent="-285750">
+              <a:buFont typeface="Arial" panose="020B0604020202020204" pitchFamily="34" charset="0"/>
+              <a:buChar char="•"/>
+            </a:pPr>
+            <a:r>
+              <a:rPr lang="en-US" sz="1800" dirty="0">
+                <a:latin typeface="Poppins" panose="00000500000000000000" pitchFamily="2" charset="-18"/>
+                <a:cs typeface="Poppins" panose="00000500000000000000" pitchFamily="2" charset="-18"/>
+              </a:rPr>
+              <a:t>Home automation voice control (Alexa, Google Home, Siri)</a:t>
+            </a:r>
+            <a:endParaRPr lang="en-US" sz="1800" dirty="0"/>
+          </a:p>
+          <a:p>
+            <a:pPr marL="285750" indent="-285750">
+              <a:buFont typeface="Arial" panose="020B0604020202020204" pitchFamily="34" charset="0"/>
+              <a:buChar char="•"/>
+            </a:pPr>
+            <a:r>
+              <a:rPr lang="en-US" sz="1800" dirty="0">
+                <a:latin typeface="Poppins" panose="00000500000000000000" pitchFamily="2" charset="-18"/>
+                <a:cs typeface="Poppins" panose="00000500000000000000" pitchFamily="2" charset="-18"/>
+              </a:rPr>
+              <a:t>In-car voice assistants for navigation and entertainment</a:t>
+            </a:r>
+            <a:endParaRPr lang="en-US" sz="1800" dirty="0"/>
+          </a:p>
+          <a:p>
+            <a:pPr marL="0" indent="0">
+              <a:buNone/>
+            </a:pPr>
+            <a:r>
+              <a:rPr lang="en-US" sz="2000" b="1" dirty="0">
+                <a:latin typeface="Poppins" panose="00000500000000000000" pitchFamily="2" charset="-18"/>
+                <a:cs typeface="Poppins" panose="00000500000000000000" pitchFamily="2" charset="-18"/>
+              </a:rPr>
+              <a:t>Enterprise &amp; Productivity</a:t>
+            </a:r>
+            <a:endParaRPr lang="en-US" sz="2000" b="1" dirty="0"/>
+          </a:p>
+          <a:p>
+            <a:pPr marL="285750" indent="-285750">
+              <a:buFont typeface="Arial" panose="020B0604020202020204" pitchFamily="34" charset="0"/>
+              <a:buChar char="•"/>
+            </a:pPr>
+            <a:r>
+              <a:rPr lang="en-US" sz="1800" dirty="0">
+                <a:latin typeface="Poppins" panose="00000500000000000000" pitchFamily="2" charset="-18"/>
+                <a:cs typeface="Poppins" panose="00000500000000000000" pitchFamily="2" charset="-18"/>
+              </a:rPr>
+              <a:t>Voice-driven meeting transcription and note-taking</a:t>
+            </a:r>
+            <a:endParaRPr lang="en-US" sz="1800" dirty="0"/>
+          </a:p>
+          <a:p>
+            <a:pPr marL="285750" indent="-285750">
+              <a:buFont typeface="Arial" panose="020B0604020202020204" pitchFamily="34" charset="0"/>
+              <a:buChar char="•"/>
+            </a:pPr>
+            <a:r>
+              <a:rPr lang="en-US" sz="1800" dirty="0">
+                <a:latin typeface="Poppins" panose="00000500000000000000" pitchFamily="2" charset="-18"/>
+                <a:cs typeface="Poppins" panose="00000500000000000000" pitchFamily="2" charset="-18"/>
+              </a:rPr>
+              <a:t>Hands-free data entry and workflow automation</a:t>
+            </a:r>
+            <a:endParaRPr lang="en-US" sz="1800" dirty="0"/>
+          </a:p>
+        </p:txBody>
+      </p:sp>
+    </p:spTree>
+    <p:extLst>
+      <p:ext uri="{BB962C8B-B14F-4D97-AF65-F5344CB8AC3E}">
+        <p14:creationId xmlns:p14="http://schemas.microsoft.com/office/powerpoint/2010/main" val="1833796837"/>
+      </p:ext>
+    </p:extLst>
+  </p:cSld>
+  <p:clrMapOvr>
+    <a:masterClrMapping/>
+  </p:clrMapOvr>
+</p:sld>
+</file>
+
+<file path=ppt/slides/slide16.xml><?xml version="1.0" encoding="utf-8"?>
+<p:sld xmlns:a="http://schemas.openxmlformats.org/drawingml/2006/main" xmlns:r="http://schemas.openxmlformats.org/officeDocument/2006/relationships" xmlns:p="http://schemas.openxmlformats.org/presentationml/2006/main">
+  <p:cSld>
+    <p:spTree>
+      <p:nvGrpSpPr>
+        <p:cNvPr id="1" name="Shape">
+          <a:extLst>
+            <a:ext uri="{FF2B5EF4-FFF2-40B4-BE49-F238E27FC236}">
+              <a16:creationId xmlns:a16="http://schemas.microsoft.com/office/drawing/2014/main" id="{208C1C28-EC0A-4D33-9AEF-25D1F1FBBA8C}"/>
+            </a:ext>
+          </a:extLst>
+        </p:cNvPr>
+        <p:cNvGrpSpPr/>
+        <p:nvPr/>
+      </p:nvGrpSpPr>
+      <p:grpSpPr>
+        <a:xfrm>
+          <a:off x="0" y="0"/>
+          <a:ext cx="0" cy="0"/>
+          <a:chOff x="0" y="0"/>
+          <a:chExt cx="0" cy="0"/>
+        </a:xfrm>
+      </p:grpSpPr>
+      <p:sp>
+        <p:nvSpPr>
+          <p:cNvPr id="2" name="Title">
+            <a:extLst>
+              <a:ext uri="{FF2B5EF4-FFF2-40B4-BE49-F238E27FC236}">
+                <a16:creationId xmlns:a16="http://schemas.microsoft.com/office/drawing/2014/main" id="{CE163448-4995-46F9-B11E-DDD4AFE291FB}"/>
+              </a:ext>
+            </a:extLst>
+          </p:cNvPr>
+          <p:cNvSpPr txBox="1"/>
+          <p:nvPr/>
+        </p:nvSpPr>
+        <p:spPr>
+          <a:xfrm>
+            <a:off x="407988" y="450000"/>
+            <a:ext cx="11376000" cy="550000"/>
+          </a:xfrm>
+          <a:prstGeom prst="rect">
+            <a:avLst/>
+          </a:prstGeom>
+          <a:noFill/>
+          <a:ln>
+            <a:noFill/>
+          </a:ln>
+        </p:spPr>
+        <p:txBody>
+          <a:bodyPr spcFirstLastPara="1" wrap="square" lIns="91425" tIns="45700" rIns="91425" bIns="45700" anchor="t" anchorCtr="0">
+            <a:spAutoFit/>
+          </a:bodyPr>
+          <a:lstStyle/>
+          <a:p>
+            <a:pPr marL="0" marR="0" lvl="0" indent="0" algn="l" rtl="0">
+              <a:spcBef>
+                <a:spcPts val="0"/>
+              </a:spcBef>
+              <a:spcAft>
+                <a:spcPts val="0"/>
+              </a:spcAft>
+              <a:buNone/>
+            </a:pPr>
+            <a:r>
+              <a:rPr lang="en-US" sz="2800" b="1" dirty="0">
+                <a:solidFill>
+                  <a:schemeClr val="dk1"/>
+                </a:solidFill>
+                <a:latin typeface="Poppins"/>
+                <a:ea typeface="Poppins"/>
+                <a:cs typeface="Poppins"/>
+                <a:sym typeface="Poppins"/>
+              </a:rPr>
+              <a:t>Voice AI Architectures</a:t>
+            </a:r>
+            <a:endParaRPr sz="2800" b="1" dirty="0">
+              <a:solidFill>
+                <a:schemeClr val="dk1"/>
+              </a:solidFill>
+              <a:latin typeface="Poppins"/>
+            </a:endParaRPr>
+          </a:p>
+        </p:txBody>
+      </p:sp>
+      <p:sp>
+        <p:nvSpPr>
+          <p:cNvPr id="4" name="Subtitle">
+            <a:extLst>
+              <a:ext uri="{FF2B5EF4-FFF2-40B4-BE49-F238E27FC236}">
+                <a16:creationId xmlns:a16="http://schemas.microsoft.com/office/drawing/2014/main" id="{F263BF1C-ACC9-4FC7-BCCC-F8469C1B5D17}"/>
+              </a:ext>
+            </a:extLst>
+          </p:cNvPr>
+          <p:cNvSpPr txBox="1"/>
+          <p:nvPr/>
+        </p:nvSpPr>
+        <p:spPr>
+          <a:xfrm>
+            <a:off x="407988" y="1050000"/>
+            <a:ext cx="11376000" cy="400000"/>
+          </a:xfrm>
+          <a:prstGeom prst="rect">
+            <a:avLst/>
+          </a:prstGeom>
+          <a:noFill/>
+        </p:spPr>
+        <p:txBody>
+          <a:bodyPr wrap="square" lIns="91425" tIns="45700" rIns="91425" bIns="45700" anchor="t"/>
+          <a:lstStyle/>
+          <a:p>
+            <a:r>
+              <a:rPr lang="en-US" sz="1600" i="1" dirty="0">
+                <a:solidFill>
+                  <a:srgbClr val="666666"/>
+                </a:solidFill>
+                <a:latin typeface="Poppins" panose="00000500000000000000" pitchFamily="2" charset="-18"/>
+              </a:rPr>
+              <a:t>Two main approaches to building voice AI systems</a:t>
+            </a:r>
+          </a:p>
+        </p:txBody>
+      </p:sp>
+      <p:sp>
+        <p:nvSpPr>
+          <p:cNvPr id="3" name="Content">
+            <a:extLst>
+              <a:ext uri="{FF2B5EF4-FFF2-40B4-BE49-F238E27FC236}">
+                <a16:creationId xmlns:a16="http://schemas.microsoft.com/office/drawing/2014/main" id="{AC728600-A70B-4877-822F-19F2195DB628}"/>
+              </a:ext>
+            </a:extLst>
+          </p:cNvPr>
+          <p:cNvSpPr txBox="1"/>
+          <p:nvPr/>
+        </p:nvSpPr>
+        <p:spPr>
+          <a:xfrm>
+            <a:off x="407988" y="1500000"/>
+            <a:ext cx="11376000" cy="5000000"/>
+          </a:xfrm>
+          <a:prstGeom prst="rect">
+            <a:avLst/>
+          </a:prstGeom>
+          <a:noFill/>
+        </p:spPr>
+        <p:txBody>
+          <a:bodyPr wrap="square" lIns="91425" tIns="45700" rIns="91425" bIns="45700" anchor="t">
+            <a:spAutoFit/>
+          </a:bodyPr>
+          <a:lstStyle/>
+          <a:p>
+            <a:pPr marL="0" indent="0">
+              <a:buNone/>
+            </a:pPr>
+            <a:r>
+              <a:rPr lang="en-US" sz="2000" b="1" dirty="0">
+                <a:latin typeface="Poppins" panose="00000500000000000000" pitchFamily="2" charset="-18"/>
+                <a:cs typeface="Poppins" panose="00000500000000000000" pitchFamily="2" charset="-18"/>
+              </a:rPr>
+              <a:t>3-Phase Pipeline (STT → LLM → TTS)</a:t>
+            </a:r>
+            <a:endParaRPr lang="en-US" sz="2000" b="1" dirty="0"/>
+          </a:p>
+          <a:p>
+            <a:pPr marL="285750" indent="-285750">
+              <a:buFont typeface="Arial" panose="020B0604020202020204" pitchFamily="34" charset="0"/>
+              <a:buChar char="•"/>
+            </a:pPr>
+            <a:r>
+              <a:rPr lang="en-US" sz="1800" dirty="0">
+                <a:latin typeface="Poppins" panose="00000500000000000000" pitchFamily="2" charset="-18"/>
+                <a:cs typeface="Poppins" panose="00000500000000000000" pitchFamily="2" charset="-18"/>
+              </a:rPr>
+              <a:t>Audio → Speech-to-Text → LLM processes text → Text-to-Speech → Audio</a:t>
+            </a:r>
+            <a:endParaRPr lang="en-US" sz="1800" dirty="0"/>
+          </a:p>
+          <a:p>
+            <a:pPr marL="285750" indent="-285750">
+              <a:buFont typeface="Arial" panose="020B0604020202020204" pitchFamily="34" charset="0"/>
+              <a:buChar char="•"/>
+            </a:pPr>
+            <a:r>
+              <a:rPr lang="en-US" sz="1800" dirty="0">
+                <a:latin typeface="Poppins" panose="00000500000000000000" pitchFamily="2" charset="-18"/>
+                <a:cs typeface="Poppins" panose="00000500000000000000" pitchFamily="2" charset="-18"/>
+              </a:rPr>
+              <a:t>Each component is separate and can be optimized independently</a:t>
+            </a:r>
+            <a:endParaRPr lang="en-US" sz="1800" dirty="0"/>
+          </a:p>
+          <a:p>
+            <a:pPr marL="285750" indent="-285750">
+              <a:buFont typeface="Arial" panose="020B0604020202020204" pitchFamily="34" charset="0"/>
+              <a:buChar char="•"/>
+            </a:pPr>
+            <a:r>
+              <a:rPr lang="en-US" sz="1800" dirty="0">
+                <a:latin typeface="Poppins" panose="00000500000000000000" pitchFamily="2" charset="-18"/>
+                <a:cs typeface="Poppins" panose="00000500000000000000" pitchFamily="2" charset="-18"/>
+              </a:rPr>
+              <a:t>Total latency = STT latency + LLM latency + TTS latency (typically 1-3+ seconds)</a:t>
+            </a:r>
+            <a:endParaRPr lang="en-US" sz="1800" dirty="0"/>
+          </a:p>
+          <a:p>
+            <a:pPr marL="0" indent="0">
+              <a:buNone/>
+            </a:pPr>
+            <a:r>
+              <a:rPr lang="en-US" sz="2000" b="1" dirty="0">
+                <a:latin typeface="Poppins" panose="00000500000000000000" pitchFamily="2" charset="-18"/>
+                <a:cs typeface="Poppins" panose="00000500000000000000" pitchFamily="2" charset="-18"/>
+              </a:rPr>
+              <a:t>Realtime Voice-to-Voice (Speech-to-Speech)</a:t>
+            </a:r>
+            <a:endParaRPr lang="en-US" sz="2000" b="1" dirty="0"/>
+          </a:p>
+          <a:p>
+            <a:pPr marL="285750" indent="-285750">
+              <a:buFont typeface="Arial" panose="020B0604020202020204" pitchFamily="34" charset="0"/>
+              <a:buChar char="•"/>
+            </a:pPr>
+            <a:r>
+              <a:rPr lang="en-US" sz="1800" dirty="0">
+                <a:latin typeface="Poppins" panose="00000500000000000000" pitchFamily="2" charset="-18"/>
+                <a:cs typeface="Poppins" panose="00000500000000000000" pitchFamily="2" charset="-18"/>
+              </a:rPr>
+              <a:t>Single model processes audio directly without intermediate text conversion</a:t>
+            </a:r>
+            <a:endParaRPr lang="en-US" sz="1800" dirty="0"/>
+          </a:p>
+          <a:p>
+            <a:pPr marL="285750" indent="-285750">
+              <a:buFont typeface="Arial" panose="020B0604020202020204" pitchFamily="34" charset="0"/>
+              <a:buChar char="•"/>
+            </a:pPr>
+            <a:r>
+              <a:rPr lang="en-US" sz="1800" dirty="0">
+                <a:latin typeface="Poppins" panose="00000500000000000000" pitchFamily="2" charset="-18"/>
+                <a:cs typeface="Poppins" panose="00000500000000000000" pitchFamily="2" charset="-18"/>
+              </a:rPr>
+              <a:t>Examples: GPT-4o Realtime API, Gemini 2.0 Live, Moshi by Kyutai</a:t>
+            </a:r>
+            <a:endParaRPr lang="en-US" sz="1800" dirty="0"/>
+          </a:p>
+          <a:p>
+            <a:pPr marL="285750" indent="-285750">
+              <a:buFont typeface="Arial" panose="020B0604020202020204" pitchFamily="34" charset="0"/>
+              <a:buChar char="•"/>
+            </a:pPr>
+            <a:r>
+              <a:rPr lang="en-US" sz="1800" dirty="0">
+                <a:latin typeface="Poppins" panose="00000500000000000000" pitchFamily="2" charset="-18"/>
+                <a:cs typeface="Poppins" panose="00000500000000000000" pitchFamily="2" charset="-18"/>
+              </a:rPr>
+              <a:t>Native understanding of tone, emotion, and paralinguistic cues</a:t>
+            </a:r>
+            <a:endParaRPr lang="en-US" sz="1800" dirty="0"/>
+          </a:p>
+          <a:p>
+            <a:pPr marL="285750" indent="-285750">
+              <a:buFont typeface="Arial" panose="020B0604020202020204" pitchFamily="34" charset="0"/>
+              <a:buChar char="•"/>
+            </a:pPr>
+            <a:r>
+              <a:rPr lang="en-US" sz="1800" dirty="0">
+                <a:latin typeface="Poppins" panose="00000500000000000000" pitchFamily="2" charset="-18"/>
+                <a:cs typeface="Poppins" panose="00000500000000000000" pitchFamily="2" charset="-18"/>
+              </a:rPr>
+              <a:t>Latency as low as 200-500ms for near-instant responses</a:t>
+            </a:r>
+            <a:endParaRPr lang="en-US" sz="1800" dirty="0"/>
+          </a:p>
+        </p:txBody>
+      </p:sp>
+    </p:spTree>
+    <p:extLst>
+      <p:ext uri="{BB962C8B-B14F-4D97-AF65-F5344CB8AC3E}">
+        <p14:creationId xmlns:p14="http://schemas.microsoft.com/office/powerpoint/2010/main" val="3296906528"/>
+      </p:ext>
+    </p:extLst>
+  </p:cSld>
+  <p:clrMapOvr>
+    <a:masterClrMapping/>
+  </p:clrMapOvr>
+</p:sld>
+</file>
+
+<file path=ppt/slides/slide17.xml><?xml version="1.0" encoding="utf-8"?>
+<p:sld xmlns:a="http://schemas.openxmlformats.org/drawingml/2006/main" xmlns:r="http://schemas.openxmlformats.org/officeDocument/2006/relationships" xmlns:p="http://schemas.openxmlformats.org/presentationml/2006/main">
+  <p:cSld>
+    <p:spTree>
+      <p:nvGrpSpPr>
+        <p:cNvPr id="1" name="Shape">
+          <a:extLst>
+            <a:ext uri="{FF2B5EF4-FFF2-40B4-BE49-F238E27FC236}">
+              <a16:creationId xmlns:a16="http://schemas.microsoft.com/office/drawing/2014/main" id="{72734098-95E6-481D-AD38-5EC88F9F9F03}"/>
+            </a:ext>
+          </a:extLst>
+        </p:cNvPr>
+        <p:cNvGrpSpPr/>
+        <p:nvPr/>
+      </p:nvGrpSpPr>
+      <p:grpSpPr>
+        <a:xfrm>
+          <a:off x="0" y="0"/>
+          <a:ext cx="0" cy="0"/>
+          <a:chOff x="0" y="0"/>
+          <a:chExt cx="0" cy="0"/>
+        </a:xfrm>
+      </p:grpSpPr>
+      <p:sp>
+        <p:nvSpPr>
+          <p:cNvPr id="2" name="Title">
+            <a:extLst>
+              <a:ext uri="{FF2B5EF4-FFF2-40B4-BE49-F238E27FC236}">
+                <a16:creationId xmlns:a16="http://schemas.microsoft.com/office/drawing/2014/main" id="{49D11B79-530B-4F31-B427-36B2B6E5A760}"/>
+              </a:ext>
+            </a:extLst>
+          </p:cNvPr>
+          <p:cNvSpPr txBox="1"/>
+          <p:nvPr/>
+        </p:nvSpPr>
+        <p:spPr>
+          <a:xfrm>
+            <a:off x="407988" y="450000"/>
+            <a:ext cx="11376000" cy="550000"/>
+          </a:xfrm>
+          <a:prstGeom prst="rect">
+            <a:avLst/>
+          </a:prstGeom>
+          <a:noFill/>
+        </p:spPr>
+        <p:txBody>
+          <a:bodyPr wrap="square" lIns="91425" tIns="45700" rIns="91425" bIns="45700" anchor="t">
+            <a:spAutoFit/>
+          </a:bodyPr>
+          <a:lstStyle/>
+          <a:p>
+            <a:pPr>
+              <a:buNone/>
+            </a:pPr>
+            <a:r>
+              <a:rPr lang="en-US" sz="2800" b="1" dirty="0">
+                <a:solidFill>
+                  <a:schemeClr val="dk1"/>
+                </a:solidFill>
+                <a:latin typeface="Poppins"/>
+              </a:rPr>
+              <a:t>3-Phase vs Realtime: Pros and Cons</a:t>
+            </a:r>
+          </a:p>
+        </p:txBody>
+      </p:sp>
+      <p:sp>
+        <p:nvSpPr>
+          <p:cNvPr id="3" name="Left Header">
+            <a:extLst>
+              <a:ext uri="{FF2B5EF4-FFF2-40B4-BE49-F238E27FC236}">
+                <a16:creationId xmlns:a16="http://schemas.microsoft.com/office/drawing/2014/main" id="{0D9B0936-4D9C-4B15-9320-6F00A3BCD2DD}"/>
+              </a:ext>
+            </a:extLst>
+          </p:cNvPr>
+          <p:cNvSpPr txBox="1"/>
+          <p:nvPr/>
+        </p:nvSpPr>
+        <p:spPr>
+          <a:xfrm>
+            <a:off x="407988" y="1200000"/>
+            <a:ext cx="5500000" cy="400000"/>
+          </a:xfrm>
+          <a:prstGeom prst="rect">
+            <a:avLst/>
+          </a:prstGeom>
+          <a:noFill/>
+        </p:spPr>
+        <p:txBody>
+          <a:bodyPr wrap="square" anchor="t"/>
+          <a:lstStyle/>
+          <a:p>
+            <a:r>
+              <a:rPr lang="en-US" sz="2000" b="1" dirty="0">
+                <a:solidFill>
+                  <a:srgbClr val="002060"/>
+                </a:solidFill>
+                <a:latin typeface="Poppins"/>
+              </a:rPr>
+              <a:t>3-Phase Pipeline (STT-LLM-TTS)</a:t>
+            </a:r>
+          </a:p>
+        </p:txBody>
+      </p:sp>
+      <p:sp>
+        <p:nvSpPr>
+          <p:cNvPr id="4" name="Left Content">
+            <a:extLst>
+              <a:ext uri="{FF2B5EF4-FFF2-40B4-BE49-F238E27FC236}">
+                <a16:creationId xmlns:a16="http://schemas.microsoft.com/office/drawing/2014/main" id="{28E48D9B-10F1-4D4E-B279-4FD982DFD3CD}"/>
+              </a:ext>
+            </a:extLst>
+          </p:cNvPr>
+          <p:cNvSpPr txBox="1"/>
+          <p:nvPr/>
+        </p:nvSpPr>
+        <p:spPr>
+          <a:xfrm>
+            <a:off x="407988" y="1650000"/>
+            <a:ext cx="5500000" cy="4800000"/>
+          </a:xfrm>
+          <a:prstGeom prst="rect">
+            <a:avLst/>
+          </a:prstGeom>
+          <a:noFill/>
+        </p:spPr>
+        <p:txBody>
+          <a:bodyPr wrap="square" anchor="t">
+            <a:spAutoFit/>
+          </a:bodyPr>
+          <a:lstStyle/>
+          <a:p>
+            <a:pPr marL="285750" indent="-285750">
+              <a:buFont typeface="Arial" panose="020B0604020202020204" pitchFamily="34" charset="0"/>
+              <a:buChar char="•"/>
+            </a:pPr>
+            <a:r>
+              <a:rPr lang="en-US" sz="1600" dirty="0">
+                <a:latin typeface="Poppins" panose="00000500000000000000" pitchFamily="2" charset="-18"/>
+                <a:cs typeface="Poppins" panose="00000500000000000000" pitchFamily="2" charset="-18"/>
+              </a:rPr>
+              <a:t>Flexible: swap components easily</a:t>
+            </a:r>
+          </a:p>
+          <a:p>
+            <a:pPr marL="285750" indent="-285750">
+              <a:buFont typeface="Arial" panose="020B0604020202020204" pitchFamily="34" charset="0"/>
+              <a:buChar char="•"/>
+            </a:pPr>
+            <a:r>
+              <a:rPr lang="en-US" sz="1600" dirty="0">
+                <a:latin typeface="Poppins" panose="00000500000000000000" pitchFamily="2" charset="-18"/>
+                <a:cs typeface="Poppins" panose="00000500000000000000" pitchFamily="2" charset="-18"/>
+              </a:rPr>
+              <a:t>Mature ecosystem with many providers</a:t>
+            </a:r>
+          </a:p>
+          <a:p>
+            <a:pPr marL="285750" indent="-285750">
+              <a:buFont typeface="Arial" panose="020B0604020202020204" pitchFamily="34" charset="0"/>
+              <a:buChar char="•"/>
+            </a:pPr>
+            <a:r>
+              <a:rPr lang="en-US" sz="1600" dirty="0">
+                <a:latin typeface="Poppins" panose="00000500000000000000" pitchFamily="2" charset="-18"/>
+                <a:cs typeface="Poppins" panose="00000500000000000000" pitchFamily="2" charset="-18"/>
+              </a:rPr>
+              <a:t>Better text accuracy for complex content</a:t>
+            </a:r>
+          </a:p>
+          <a:p>
+            <a:pPr marL="285750" indent="-285750">
+              <a:buFont typeface="Arial" panose="020B0604020202020204" pitchFamily="34" charset="0"/>
+              <a:buChar char="•"/>
+            </a:pPr>
+            <a:r>
+              <a:rPr lang="en-US" sz="1600" dirty="0">
+                <a:latin typeface="Poppins" panose="00000500000000000000" pitchFamily="2" charset="-18"/>
+                <a:cs typeface="Poppins" panose="00000500000000000000" pitchFamily="2" charset="-18"/>
+              </a:rPr>
+              <a:t>Easier to debug and monitor each step</a:t>
+            </a:r>
+          </a:p>
+          <a:p>
+            <a:pPr marL="285750" indent="-285750">
+              <a:buFont typeface="Arial" panose="020B0604020202020204" pitchFamily="34" charset="0"/>
+              <a:buChar char="•"/>
+            </a:pPr>
+            <a:r>
+              <a:rPr lang="en-US" sz="1600" dirty="0">
+                <a:latin typeface="Poppins" panose="00000500000000000000" pitchFamily="2" charset="-18"/>
+                <a:cs typeface="Poppins" panose="00000500000000000000" pitchFamily="2" charset="-18"/>
+              </a:rPr>
+              <a:t>Works with any LLM (GPT-4, Claude, etc.)</a:t>
+            </a:r>
+          </a:p>
+          <a:p>
+            <a:pPr marL="285750" indent="-285750">
+              <a:buFont typeface="Arial" panose="020B0604020202020204" pitchFamily="34" charset="0"/>
+              <a:buChar char="•"/>
+            </a:pPr>
+            <a:r>
+              <a:rPr lang="en-US" sz="1600" dirty="0">
+                <a:latin typeface="Poppins" panose="00000500000000000000" pitchFamily="2" charset="-18"/>
+                <a:cs typeface="Poppins" panose="00000500000000000000" pitchFamily="2" charset="-18"/>
+              </a:rPr>
+              <a:t>Higher latency (1-3+ seconds total)</a:t>
+            </a:r>
+          </a:p>
+          <a:p>
+            <a:pPr marL="285750" indent="-285750">
+              <a:buFont typeface="Arial" panose="020B0604020202020204" pitchFamily="34" charset="0"/>
+              <a:buChar char="•"/>
+            </a:pPr>
+            <a:r>
+              <a:rPr lang="en-US" sz="1600" dirty="0">
+                <a:latin typeface="Poppins" panose="00000500000000000000" pitchFamily="2" charset="-18"/>
+                <a:cs typeface="Poppins" panose="00000500000000000000" pitchFamily="2" charset="-18"/>
+              </a:rPr>
+              <a:t>Loses audio context (tone, emotion)</a:t>
+            </a:r>
+          </a:p>
+          <a:p>
+            <a:pPr marL="285750" indent="-285750">
+              <a:buFont typeface="Arial" panose="020B0604020202020204" pitchFamily="34" charset="0"/>
+              <a:buChar char="•"/>
+            </a:pPr>
+            <a:r>
+              <a:rPr lang="en-US" sz="1600" dirty="0">
+                <a:latin typeface="Poppins" panose="00000500000000000000" pitchFamily="2" charset="-18"/>
+                <a:cs typeface="Poppins" panose="00000500000000000000" pitchFamily="2" charset="-18"/>
+              </a:rPr>
+              <a:t>Cannot handle overlapping speech well</a:t>
+            </a:r>
+          </a:p>
+        </p:txBody>
+      </p:sp>
+      <p:sp>
+        <p:nvSpPr>
+          <p:cNvPr id="5" name="Right Header">
+            <a:extLst>
+              <a:ext uri="{FF2B5EF4-FFF2-40B4-BE49-F238E27FC236}">
+                <a16:creationId xmlns:a16="http://schemas.microsoft.com/office/drawing/2014/main" id="{9E427B11-D9B4-461C-B306-2657E9826367}"/>
+              </a:ext>
+            </a:extLst>
+          </p:cNvPr>
+          <p:cNvSpPr txBox="1"/>
+          <p:nvPr/>
+        </p:nvSpPr>
+        <p:spPr>
+          <a:xfrm>
+            <a:off x="6200000" y="1200000"/>
+            <a:ext cx="5500000" cy="400000"/>
+          </a:xfrm>
+          <a:prstGeom prst="rect">
+            <a:avLst/>
+          </a:prstGeom>
+          <a:noFill/>
+        </p:spPr>
+        <p:txBody>
+          <a:bodyPr wrap="square" anchor="t"/>
+          <a:lstStyle/>
+          <a:p>
+            <a:r>
+              <a:rPr lang="en-US" sz="2000" b="1" dirty="0">
+                <a:solidFill>
+                  <a:srgbClr val="002060"/>
+                </a:solidFill>
+                <a:latin typeface="Poppins"/>
+              </a:rPr>
+              <a:t>Realtime Voice-to-Voice</a:t>
+            </a:r>
+          </a:p>
+        </p:txBody>
+      </p:sp>
+      <p:sp>
+        <p:nvSpPr>
+          <p:cNvPr id="6" name="Right Content">
+            <a:extLst>
+              <a:ext uri="{FF2B5EF4-FFF2-40B4-BE49-F238E27FC236}">
+                <a16:creationId xmlns:a16="http://schemas.microsoft.com/office/drawing/2014/main" id="{874D83DD-1134-48E9-BACA-E943AB8EDEE5}"/>
+              </a:ext>
+            </a:extLst>
+          </p:cNvPr>
+          <p:cNvSpPr txBox="1"/>
+          <p:nvPr/>
+        </p:nvSpPr>
+        <p:spPr>
+          <a:xfrm>
+            <a:off x="6200000" y="1650000"/>
+            <a:ext cx="5500000" cy="4800000"/>
+          </a:xfrm>
+          <a:prstGeom prst="rect">
+            <a:avLst/>
+          </a:prstGeom>
+          <a:noFill/>
+        </p:spPr>
+        <p:txBody>
+          <a:bodyPr wrap="square" anchor="t">
+            <a:spAutoFit/>
+          </a:bodyPr>
+          <a:lstStyle/>
+          <a:p>
+            <a:pPr marL="285750" indent="-285750">
+              <a:buFont typeface="Arial" panose="020B0604020202020204" pitchFamily="34" charset="0"/>
+              <a:buChar char="•"/>
+            </a:pPr>
+            <a:r>
+              <a:rPr lang="en-US" sz="1600" dirty="0">
+                <a:latin typeface="Poppins" panose="00000500000000000000" pitchFamily="2" charset="-18"/>
+                <a:cs typeface="Poppins" panose="00000500000000000000" pitchFamily="2" charset="-18"/>
+              </a:rPr>
+              <a:t>Ultra-low latency (~200-500ms)</a:t>
+            </a:r>
+          </a:p>
+          <a:p>
+            <a:pPr marL="285750" indent="-285750">
+              <a:buFont typeface="Arial" panose="020B0604020202020204" pitchFamily="34" charset="0"/>
+              <a:buChar char="•"/>
+            </a:pPr>
+            <a:r>
+              <a:rPr lang="en-US" sz="1600" dirty="0">
+                <a:latin typeface="Poppins" panose="00000500000000000000" pitchFamily="2" charset="-18"/>
+                <a:cs typeface="Poppins" panose="00000500000000000000" pitchFamily="2" charset="-18"/>
+              </a:rPr>
+              <a:t>Natural interruption handling</a:t>
+            </a:r>
+          </a:p>
+          <a:p>
+            <a:pPr marL="285750" indent="-285750">
+              <a:buFont typeface="Arial" panose="020B0604020202020204" pitchFamily="34" charset="0"/>
+              <a:buChar char="•"/>
+            </a:pPr>
+            <a:r>
+              <a:rPr lang="en-US" sz="1600" dirty="0">
+                <a:latin typeface="Poppins" panose="00000500000000000000" pitchFamily="2" charset="-18"/>
+                <a:cs typeface="Poppins" panose="00000500000000000000" pitchFamily="2" charset="-18"/>
+              </a:rPr>
+              <a:t>Preserves emotional/tonal context</a:t>
+            </a:r>
+          </a:p>
+          <a:p>
+            <a:pPr marL="285750" indent="-285750">
+              <a:buFont typeface="Arial" panose="020B0604020202020204" pitchFamily="34" charset="0"/>
+              <a:buChar char="•"/>
+            </a:pPr>
+            <a:r>
+              <a:rPr lang="en-US" sz="1600" dirty="0">
+                <a:latin typeface="Poppins" panose="00000500000000000000" pitchFamily="2" charset="-18"/>
+                <a:cs typeface="Poppins" panose="00000500000000000000" pitchFamily="2" charset="-18"/>
+              </a:rPr>
+              <a:t>More human-like conversations</a:t>
+            </a:r>
+          </a:p>
+          <a:p>
+            <a:pPr marL="285750" indent="-285750">
+              <a:buFont typeface="Arial" panose="020B0604020202020204" pitchFamily="34" charset="0"/>
+              <a:buChar char="•"/>
+            </a:pPr>
+            <a:r>
+              <a:rPr lang="en-US" sz="1600" dirty="0">
+                <a:latin typeface="Poppins" panose="00000500000000000000" pitchFamily="2" charset="-18"/>
+                <a:cs typeface="Poppins" panose="00000500000000000000" pitchFamily="2" charset="-18"/>
+              </a:rPr>
+              <a:t>Better for real-time interactions</a:t>
+            </a:r>
+          </a:p>
+          <a:p>
+            <a:pPr marL="285750" indent="-285750">
+              <a:buFont typeface="Arial" panose="020B0604020202020204" pitchFamily="34" charset="0"/>
+              <a:buChar char="•"/>
+            </a:pPr>
+            <a:r>
+              <a:rPr lang="en-US" sz="1600" dirty="0">
+                <a:latin typeface="Poppins" panose="00000500000000000000" pitchFamily="2" charset="-18"/>
+                <a:cs typeface="Poppins" panose="00000500000000000000" pitchFamily="2" charset="-18"/>
+              </a:rPr>
+              <a:t>Limited model options currently</a:t>
+            </a:r>
+          </a:p>
+          <a:p>
+            <a:pPr marL="285750" indent="-285750">
+              <a:buFont typeface="Arial" panose="020B0604020202020204" pitchFamily="34" charset="0"/>
+              <a:buChar char="•"/>
+            </a:pPr>
+            <a:r>
+              <a:rPr lang="en-US" sz="1600" dirty="0">
+                <a:latin typeface="Poppins" panose="00000500000000000000" pitchFamily="2" charset="-18"/>
+                <a:cs typeface="Poppins" panose="00000500000000000000" pitchFamily="2" charset="-18"/>
+              </a:rPr>
+              <a:t>Higher compute costs</a:t>
+            </a:r>
+          </a:p>
+          <a:p>
+            <a:pPr marL="285750" indent="-285750">
+              <a:buFont typeface="Arial" panose="020B0604020202020204" pitchFamily="34" charset="0"/>
+              <a:buChar char="•"/>
+            </a:pPr>
+            <a:r>
+              <a:rPr lang="en-US" sz="1600" dirty="0">
+                <a:latin typeface="Poppins" panose="00000500000000000000" pitchFamily="2" charset="-18"/>
+                <a:cs typeface="Poppins" panose="00000500000000000000" pitchFamily="2" charset="-18"/>
+              </a:rPr>
+              <a:t>Less control over individual steps</a:t>
+            </a:r>
+          </a:p>
+        </p:txBody>
+      </p:sp>
+    </p:spTree>
+    <p:extLst>
+      <p:ext uri="{BB962C8B-B14F-4D97-AF65-F5344CB8AC3E}">
+        <p14:creationId xmlns:p14="http://schemas.microsoft.com/office/powerpoint/2010/main" val="2772466629"/>
+      </p:ext>
+    </p:extLst>
+  </p:cSld>
+  <p:clrMapOvr>
+    <a:masterClrMapping/>
+  </p:clrMapOvr>
+</p:sld>
+</file>
+
+<file path=ppt/slides/slide18.xml><?xml version="1.0" encoding="utf-8"?>
+<p:sld xmlns:a="http://schemas.openxmlformats.org/drawingml/2006/main" xmlns:r="http://schemas.openxmlformats.org/officeDocument/2006/relationships" xmlns:p="http://schemas.openxmlformats.org/presentationml/2006/main">
+  <p:cSld>
+    <p:spTree>
+      <p:nvGrpSpPr>
+        <p:cNvPr id="1" name="Shape">
+          <a:extLst>
+            <a:ext uri="{FF2B5EF4-FFF2-40B4-BE49-F238E27FC236}">
+              <a16:creationId xmlns:a16="http://schemas.microsoft.com/office/drawing/2014/main" id="{7C163E34-E40C-402B-AEA0-40F169A4CD51}"/>
+            </a:ext>
+          </a:extLst>
+        </p:cNvPr>
+        <p:cNvGrpSpPr/>
+        <p:nvPr/>
+      </p:nvGrpSpPr>
+      <p:grpSpPr>
+        <a:xfrm>
+          <a:off x="0" y="0"/>
+          <a:ext cx="0" cy="0"/>
+          <a:chOff x="0" y="0"/>
+          <a:chExt cx="0" cy="0"/>
+        </a:xfrm>
+      </p:grpSpPr>
+      <p:sp>
+        <p:nvSpPr>
+          <p:cNvPr id="2" name="Title">
+            <a:extLst>
+              <a:ext uri="{FF2B5EF4-FFF2-40B4-BE49-F238E27FC236}">
+                <a16:creationId xmlns:a16="http://schemas.microsoft.com/office/drawing/2014/main" id="{2C53C032-A002-424F-917D-57D828948994}"/>
+              </a:ext>
+            </a:extLst>
+          </p:cNvPr>
+          <p:cNvSpPr txBox="1"/>
+          <p:nvPr/>
+        </p:nvSpPr>
+        <p:spPr>
+          <a:xfrm>
+            <a:off x="407988" y="450000"/>
+            <a:ext cx="11376000" cy="550000"/>
+          </a:xfrm>
+          <a:prstGeom prst="rect">
+            <a:avLst/>
+          </a:prstGeom>
+          <a:noFill/>
+          <a:ln>
+            <a:noFill/>
+          </a:ln>
+        </p:spPr>
+        <p:txBody>
+          <a:bodyPr spcFirstLastPara="1" wrap="square" lIns="91425" tIns="45700" rIns="91425" bIns="45700" anchor="t" anchorCtr="0">
+            <a:spAutoFit/>
+          </a:bodyPr>
+          <a:lstStyle/>
+          <a:p>
+            <a:pPr marL="0" marR="0" lvl="0" indent="0" algn="l" rtl="0">
+              <a:spcBef>
+                <a:spcPts val="0"/>
+              </a:spcBef>
+              <a:spcAft>
+                <a:spcPts val="0"/>
+              </a:spcAft>
+              <a:buNone/>
+            </a:pPr>
+            <a:r>
+              <a:rPr lang="en-US" sz="2800" b="1" dirty="0">
+                <a:solidFill>
+                  <a:schemeClr val="dk1"/>
+                </a:solidFill>
+                <a:latin typeface="Poppins"/>
+                <a:ea typeface="Poppins"/>
+                <a:cs typeface="Poppins"/>
+                <a:sym typeface="Poppins"/>
+              </a:rPr>
+              <a:t>Handling Streaming &amp; Interruptions</a:t>
+            </a:r>
+            <a:endParaRPr sz="2800" b="1" dirty="0">
+              <a:solidFill>
+                <a:schemeClr val="dk1"/>
+              </a:solidFill>
+              <a:latin typeface="Poppins"/>
+            </a:endParaRPr>
+          </a:p>
+        </p:txBody>
+      </p:sp>
+      <p:sp>
+        <p:nvSpPr>
+          <p:cNvPr id="4" name="Subtitle">
+            <a:extLst>
+              <a:ext uri="{FF2B5EF4-FFF2-40B4-BE49-F238E27FC236}">
+                <a16:creationId xmlns:a16="http://schemas.microsoft.com/office/drawing/2014/main" id="{FF6B1A7C-ABD1-4423-92CD-03E171F4442F}"/>
+              </a:ext>
+            </a:extLst>
+          </p:cNvPr>
+          <p:cNvSpPr txBox="1"/>
+          <p:nvPr/>
+        </p:nvSpPr>
+        <p:spPr>
+          <a:xfrm>
+            <a:off x="407988" y="1050000"/>
+            <a:ext cx="11376000" cy="400000"/>
+          </a:xfrm>
+          <a:prstGeom prst="rect">
+            <a:avLst/>
+          </a:prstGeom>
+          <a:noFill/>
+        </p:spPr>
+        <p:txBody>
+          <a:bodyPr wrap="square" lIns="91425" tIns="45700" rIns="91425" bIns="45700" anchor="t"/>
+          <a:lstStyle/>
+          <a:p>
+            <a:r>
+              <a:rPr lang="en-US" sz="1600" i="1" dirty="0">
+                <a:solidFill>
+                  <a:srgbClr val="666666"/>
+                </a:solidFill>
+                <a:latin typeface="Poppins" panose="00000500000000000000" pitchFamily="2" charset="-18"/>
+              </a:rPr>
+              <a:t>Critical techniques for responsive voice AI</a:t>
+            </a:r>
+          </a:p>
+        </p:txBody>
+      </p:sp>
+      <p:sp>
+        <p:nvSpPr>
+          <p:cNvPr id="3" name="Content">
+            <a:extLst>
+              <a:ext uri="{FF2B5EF4-FFF2-40B4-BE49-F238E27FC236}">
+                <a16:creationId xmlns:a16="http://schemas.microsoft.com/office/drawing/2014/main" id="{F375811C-DD70-4D4C-AAFD-D2FF622D8304}"/>
+              </a:ext>
+            </a:extLst>
+          </p:cNvPr>
+          <p:cNvSpPr txBox="1"/>
+          <p:nvPr/>
+        </p:nvSpPr>
+        <p:spPr>
+          <a:xfrm>
+            <a:off x="407988" y="1500000"/>
+            <a:ext cx="11376000" cy="5000000"/>
+          </a:xfrm>
+          <a:prstGeom prst="rect">
+            <a:avLst/>
+          </a:prstGeom>
+          <a:noFill/>
+        </p:spPr>
+        <p:txBody>
+          <a:bodyPr wrap="square" lIns="91425" tIns="45700" rIns="91425" bIns="45700" anchor="t">
+            <a:spAutoFit/>
+          </a:bodyPr>
+          <a:lstStyle/>
+          <a:p>
+            <a:pPr marL="0" indent="0">
+              <a:buNone/>
+            </a:pPr>
+            <a:r>
+              <a:rPr lang="en-US" sz="2000" b="1" dirty="0">
+                <a:latin typeface="Poppins" panose="00000500000000000000" pitchFamily="2" charset="-18"/>
+                <a:cs typeface="Poppins" panose="00000500000000000000" pitchFamily="2" charset="-18"/>
+              </a:rPr>
+              <a:t>Streaming for Low Latency</a:t>
+            </a:r>
+            <a:endParaRPr lang="en-US" sz="2000" b="1" dirty="0"/>
+          </a:p>
+          <a:p>
+            <a:pPr marL="285750" indent="-285750">
+              <a:buFont typeface="Arial" panose="020B0604020202020204" pitchFamily="34" charset="0"/>
+              <a:buChar char="•"/>
+            </a:pPr>
+            <a:r>
+              <a:rPr lang="en-US" sz="1800" dirty="0">
+                <a:latin typeface="Poppins" panose="00000500000000000000" pitchFamily="2" charset="-18"/>
+                <a:cs typeface="Poppins" panose="00000500000000000000" pitchFamily="2" charset="-18"/>
+              </a:rPr>
+              <a:t>Stream STT results incrementally (partial transcripts)</a:t>
+            </a:r>
+            <a:endParaRPr lang="en-US" sz="1800" dirty="0"/>
+          </a:p>
+          <a:p>
+            <a:pPr marL="285750" indent="-285750">
+              <a:buFont typeface="Arial" panose="020B0604020202020204" pitchFamily="34" charset="0"/>
+              <a:buChar char="•"/>
+            </a:pPr>
+            <a:r>
+              <a:rPr lang="en-US" sz="1800" dirty="0">
+                <a:latin typeface="Poppins" panose="00000500000000000000" pitchFamily="2" charset="-18"/>
+                <a:cs typeface="Poppins" panose="00000500000000000000" pitchFamily="2" charset="-18"/>
+              </a:rPr>
+              <a:t>Use LLM streaming to start TTS before full response is generated</a:t>
+            </a:r>
+            <a:endParaRPr lang="en-US" sz="1800" dirty="0"/>
+          </a:p>
+          <a:p>
+            <a:pPr marL="285750" indent="-285750">
+              <a:buFont typeface="Arial" panose="020B0604020202020204" pitchFamily="34" charset="0"/>
+              <a:buChar char="•"/>
+            </a:pPr>
+            <a:r>
+              <a:rPr lang="en-US" sz="1800" dirty="0">
+                <a:latin typeface="Poppins" panose="00000500000000000000" pitchFamily="2" charset="-18"/>
+                <a:cs typeface="Poppins" panose="00000500000000000000" pitchFamily="2" charset="-18"/>
+              </a:rPr>
+              <a:t>Chunk TTS audio and play as it’s generated (don’t wait for full audio)</a:t>
+            </a:r>
+            <a:endParaRPr lang="en-US" sz="1800" dirty="0"/>
+          </a:p>
+          <a:p>
+            <a:pPr marL="285750" indent="-285750">
+              <a:buFont typeface="Arial" panose="020B0604020202020204" pitchFamily="34" charset="0"/>
+              <a:buChar char="•"/>
+            </a:pPr>
+            <a:r>
+              <a:rPr lang="en-US" sz="1800" dirty="0">
+                <a:latin typeface="Poppins" panose="00000500000000000000" pitchFamily="2" charset="-18"/>
+                <a:cs typeface="Poppins" panose="00000500000000000000" pitchFamily="2" charset="-18"/>
+              </a:rPr>
+              <a:t>Result: User hears response while it’s still being generated</a:t>
+            </a:r>
+            <a:endParaRPr lang="en-US" sz="1800" dirty="0"/>
+          </a:p>
+          <a:p>
+            <a:pPr marL="0" indent="0">
+              <a:buNone/>
+            </a:pPr>
+            <a:r>
+              <a:rPr lang="en-US" sz="2000" b="1" dirty="0">
+                <a:latin typeface="Poppins" panose="00000500000000000000" pitchFamily="2" charset="-18"/>
+                <a:cs typeface="Poppins" panose="00000500000000000000" pitchFamily="2" charset="-18"/>
+              </a:rPr>
+              <a:t>Handling Interruptions (Barge-in)</a:t>
+            </a:r>
+            <a:endParaRPr lang="en-US" sz="2000" b="1" dirty="0"/>
+          </a:p>
+          <a:p>
+            <a:pPr marL="285750" indent="-285750">
+              <a:buFont typeface="Arial" panose="020B0604020202020204" pitchFamily="34" charset="0"/>
+              <a:buChar char="•"/>
+            </a:pPr>
+            <a:r>
+              <a:rPr lang="en-US" sz="1800" dirty="0">
+                <a:latin typeface="Poppins" panose="00000500000000000000" pitchFamily="2" charset="-18"/>
+                <a:cs typeface="Poppins" panose="00000500000000000000" pitchFamily="2" charset="-18"/>
+              </a:rPr>
+              <a:t>Voice Activity Detection (VAD): Detect when user starts speaking</a:t>
+            </a:r>
+            <a:endParaRPr lang="en-US" sz="1800" dirty="0"/>
+          </a:p>
+          <a:p>
+            <a:pPr marL="285750" indent="-285750">
+              <a:buFont typeface="Arial" panose="020B0604020202020204" pitchFamily="34" charset="0"/>
+              <a:buChar char="•"/>
+            </a:pPr>
+            <a:r>
+              <a:rPr lang="en-US" sz="1800" dirty="0">
+                <a:latin typeface="Poppins" panose="00000500000000000000" pitchFamily="2" charset="-18"/>
+                <a:cs typeface="Poppins" panose="00000500000000000000" pitchFamily="2" charset="-18"/>
+              </a:rPr>
+              <a:t>Immediately stop current TTS playback when interruption detected</a:t>
+            </a:r>
+            <a:endParaRPr lang="en-US" sz="1800" dirty="0"/>
+          </a:p>
+          <a:p>
+            <a:pPr marL="285750" indent="-285750">
+              <a:buFont typeface="Arial" panose="020B0604020202020204" pitchFamily="34" charset="0"/>
+              <a:buChar char="•"/>
+            </a:pPr>
+            <a:r>
+              <a:rPr lang="en-US" sz="1800" dirty="0">
+                <a:latin typeface="Poppins" panose="00000500000000000000" pitchFamily="2" charset="-18"/>
+                <a:cs typeface="Poppins" panose="00000500000000000000" pitchFamily="2" charset="-18"/>
+              </a:rPr>
+              <a:t>Cancel pending LLM generation to save resources</a:t>
+            </a:r>
+            <a:endParaRPr lang="en-US" sz="1800" dirty="0"/>
+          </a:p>
+          <a:p>
+            <a:pPr marL="285750" indent="-285750">
+              <a:buFont typeface="Arial" panose="020B0604020202020204" pitchFamily="34" charset="0"/>
+              <a:buChar char="•"/>
+            </a:pPr>
+            <a:r>
+              <a:rPr lang="en-US" sz="1800" dirty="0">
+                <a:latin typeface="Poppins" panose="00000500000000000000" pitchFamily="2" charset="-18"/>
+                <a:cs typeface="Poppins" panose="00000500000000000000" pitchFamily="2" charset="-18"/>
+              </a:rPr>
+              <a:t>Process new user input and restart the pipeline</a:t>
+            </a:r>
+            <a:endParaRPr lang="en-US" sz="1800" dirty="0"/>
+          </a:p>
+          <a:p>
+            <a:pPr marL="0" indent="0">
+              <a:buNone/>
+            </a:pPr>
+            <a:r>
+              <a:rPr lang="en-US" sz="2000" b="1" dirty="0">
+                <a:latin typeface="Poppins" panose="00000500000000000000" pitchFamily="2" charset="-18"/>
+                <a:cs typeface="Poppins" panose="00000500000000000000" pitchFamily="2" charset="-18"/>
+              </a:rPr>
+              <a:t>Best Practices</a:t>
+            </a:r>
+            <a:endParaRPr lang="en-US" sz="2000" b="1" dirty="0"/>
+          </a:p>
+          <a:p>
+            <a:pPr marL="285750" indent="-285750">
+              <a:buFont typeface="Arial" panose="020B0604020202020204" pitchFamily="34" charset="0"/>
+              <a:buChar char="•"/>
+            </a:pPr>
+            <a:r>
+              <a:rPr lang="en-US" sz="1800" dirty="0">
+                <a:latin typeface="Poppins" panose="00000500000000000000" pitchFamily="2" charset="-18"/>
+                <a:cs typeface="Poppins" panose="00000500000000000000" pitchFamily="2" charset="-18"/>
+              </a:rPr>
+              <a:t>Use WebSockets or gRPC for real-time bidirectional communication</a:t>
+            </a:r>
+            <a:endParaRPr lang="en-US" sz="1800" dirty="0"/>
+          </a:p>
+          <a:p>
+            <a:pPr marL="285750" indent="-285750">
+              <a:buFont typeface="Arial" panose="020B0604020202020204" pitchFamily="34" charset="0"/>
+              <a:buChar char="•"/>
+            </a:pPr>
+            <a:r>
+              <a:rPr lang="en-US" sz="1800" dirty="0">
+                <a:latin typeface="Poppins" panose="00000500000000000000" pitchFamily="2" charset="-18"/>
+                <a:cs typeface="Poppins" panose="00000500000000000000" pitchFamily="2" charset="-18"/>
+              </a:rPr>
+              <a:t>Implement echo cancellation to avoid AI hearing its own voice</a:t>
+            </a:r>
+            <a:endParaRPr lang="en-US" sz="1800" dirty="0"/>
+          </a:p>
+          <a:p>
+            <a:pPr marL="285750" indent="-285750">
+              <a:buFont typeface="Arial" panose="020B0604020202020204" pitchFamily="34" charset="0"/>
+              <a:buChar char="•"/>
+            </a:pPr>
+            <a:r>
+              <a:rPr lang="en-US" sz="1800" dirty="0">
+                <a:latin typeface="Poppins" panose="00000500000000000000" pitchFamily="2" charset="-18"/>
+                <a:cs typeface="Poppins" panose="00000500000000000000" pitchFamily="2" charset="-18"/>
+              </a:rPr>
+              <a:t>Buffer management: balance between latency and audio quality</a:t>
+            </a:r>
+            <a:endParaRPr lang="en-US" sz="1800" dirty="0"/>
+          </a:p>
+        </p:txBody>
+      </p:sp>
+    </p:spTree>
+    <p:extLst>
+      <p:ext uri="{BB962C8B-B14F-4D97-AF65-F5344CB8AC3E}">
+        <p14:creationId xmlns:p14="http://schemas.microsoft.com/office/powerpoint/2010/main" val="2968363597"/>
       </p:ext>
     </p:extLst>
   </p:cSld>

</xml_diff>